<commit_message>
Slight changes for 2018
</commit_message>
<xml_diff>
--- a/Introduction to Python.pptx
+++ b/Introduction to Python.pptx
@@ -5,7 +5,7 @@
     <p:sldMasterId id="2147483660" r:id="rId1"/>
   </p:sldMasterIdLst>
   <p:notesMasterIdLst>
-    <p:notesMasterId r:id="rId21"/>
+    <p:notesMasterId r:id="rId18"/>
   </p:notesMasterIdLst>
   <p:sldIdLst>
     <p:sldId id="256" r:id="rId2"/>
@@ -21,12 +21,9 @@
     <p:sldId id="265" r:id="rId12"/>
     <p:sldId id="266" r:id="rId13"/>
     <p:sldId id="269" r:id="rId14"/>
-    <p:sldId id="267" r:id="rId15"/>
-    <p:sldId id="270" r:id="rId16"/>
-    <p:sldId id="268" r:id="rId17"/>
-    <p:sldId id="271" r:id="rId18"/>
-    <p:sldId id="272" r:id="rId19"/>
-    <p:sldId id="273" r:id="rId20"/>
+    <p:sldId id="268" r:id="rId15"/>
+    <p:sldId id="272" r:id="rId16"/>
+    <p:sldId id="273" r:id="rId17"/>
   </p:sldIdLst>
   <p:sldSz cx="9144000" cy="6858000" type="screen4x3"/>
   <p:notesSz cx="6858000" cy="9144000"/>
@@ -215,7 +212,7 @@
           <a:p>
             <a:fld id="{A0978AE3-A66F-455E-972D-B40BAA0964CD}" type="datetimeFigureOut">
               <a:rPr lang="en-GB" smtClean="0"/>
-              <a:t>22/09/2017</a:t>
+              <a:t>28/09/2018</a:t>
             </a:fld>
             <a:endParaRPr lang="en-GB"/>
           </a:p>
@@ -548,6 +545,594 @@
           <a:p>
             <a:fld id="{AE6C67D6-0A6E-460B-9D37-5356F858E280}" type="slidenum">
               <a:rPr lang="en-GB" smtClean="0"/>
+              <a:t>1</a:t>
+            </a:fld>
+            <a:endParaRPr lang="en-GB"/>
+          </a:p>
+        </p:txBody>
+      </p:sp>
+    </p:spTree>
+    <p:extLst>
+      <p:ext uri="{BB962C8B-B14F-4D97-AF65-F5344CB8AC3E}">
+        <p14:creationId xmlns:p14="http://schemas.microsoft.com/office/powerpoint/2010/main" val="2860339173"/>
+      </p:ext>
+    </p:extLst>
+  </p:cSld>
+  <p:clrMapOvr>
+    <a:masterClrMapping/>
+  </p:clrMapOvr>
+</p:notes>
+</file>
+
+<file path=ppt/notesSlides/notesSlide10.xml><?xml version="1.0" encoding="utf-8"?>
+<p:notes xmlns:a="http://schemas.openxmlformats.org/drawingml/2006/main" xmlns:r="http://schemas.openxmlformats.org/officeDocument/2006/relationships" xmlns:p="http://schemas.openxmlformats.org/presentationml/2006/main">
+  <p:cSld>
+    <p:spTree>
+      <p:nvGrpSpPr>
+        <p:cNvPr id="1" name=""/>
+        <p:cNvGrpSpPr/>
+        <p:nvPr/>
+      </p:nvGrpSpPr>
+      <p:grpSpPr>
+        <a:xfrm>
+          <a:off x="0" y="0"/>
+          <a:ext cx="0" cy="0"/>
+          <a:chOff x="0" y="0"/>
+          <a:chExt cx="0" cy="0"/>
+        </a:xfrm>
+      </p:grpSpPr>
+      <p:sp>
+        <p:nvSpPr>
+          <p:cNvPr id="2" name="Slide Image Placeholder 1"/>
+          <p:cNvSpPr>
+            <a:spLocks noGrp="1" noRot="1" noChangeAspect="1"/>
+          </p:cNvSpPr>
+          <p:nvPr>
+            <p:ph type="sldImg"/>
+          </p:nvPr>
+        </p:nvSpPr>
+        <p:spPr/>
+      </p:sp>
+      <p:sp>
+        <p:nvSpPr>
+          <p:cNvPr id="3" name="Notes Placeholder 2"/>
+          <p:cNvSpPr>
+            <a:spLocks noGrp="1"/>
+          </p:cNvSpPr>
+          <p:nvPr>
+            <p:ph type="body" idx="1"/>
+          </p:nvPr>
+        </p:nvSpPr>
+        <p:spPr/>
+        <p:txBody>
+          <a:bodyPr/>
+          <a:lstStyle/>
+          <a:p>
+            <a:endParaRPr lang="en-GB"/>
+          </a:p>
+        </p:txBody>
+      </p:sp>
+      <p:sp>
+        <p:nvSpPr>
+          <p:cNvPr id="4" name="Slide Number Placeholder 3"/>
+          <p:cNvSpPr>
+            <a:spLocks noGrp="1"/>
+          </p:cNvSpPr>
+          <p:nvPr>
+            <p:ph type="sldNum" sz="quarter" idx="10"/>
+          </p:nvPr>
+        </p:nvSpPr>
+        <p:spPr/>
+        <p:txBody>
+          <a:bodyPr/>
+          <a:lstStyle/>
+          <a:p>
+            <a:fld id="{AE6C67D6-0A6E-460B-9D37-5356F858E280}" type="slidenum">
+              <a:rPr lang="en-GB" smtClean="0"/>
+              <a:t>10</a:t>
+            </a:fld>
+            <a:endParaRPr lang="en-GB"/>
+          </a:p>
+        </p:txBody>
+      </p:sp>
+    </p:spTree>
+    <p:extLst>
+      <p:ext uri="{BB962C8B-B14F-4D97-AF65-F5344CB8AC3E}">
+        <p14:creationId xmlns:p14="http://schemas.microsoft.com/office/powerpoint/2010/main" val="2300949049"/>
+      </p:ext>
+    </p:extLst>
+  </p:cSld>
+  <p:clrMapOvr>
+    <a:masterClrMapping/>
+  </p:clrMapOvr>
+</p:notes>
+</file>
+
+<file path=ppt/notesSlides/notesSlide11.xml><?xml version="1.0" encoding="utf-8"?>
+<p:notes xmlns:a="http://schemas.openxmlformats.org/drawingml/2006/main" xmlns:r="http://schemas.openxmlformats.org/officeDocument/2006/relationships" xmlns:p="http://schemas.openxmlformats.org/presentationml/2006/main">
+  <p:cSld>
+    <p:spTree>
+      <p:nvGrpSpPr>
+        <p:cNvPr id="1" name=""/>
+        <p:cNvGrpSpPr/>
+        <p:nvPr/>
+      </p:nvGrpSpPr>
+      <p:grpSpPr>
+        <a:xfrm>
+          <a:off x="0" y="0"/>
+          <a:ext cx="0" cy="0"/>
+          <a:chOff x="0" y="0"/>
+          <a:chExt cx="0" cy="0"/>
+        </a:xfrm>
+      </p:grpSpPr>
+      <p:sp>
+        <p:nvSpPr>
+          <p:cNvPr id="2" name="Slide Image Placeholder 1"/>
+          <p:cNvSpPr>
+            <a:spLocks noGrp="1" noRot="1" noChangeAspect="1"/>
+          </p:cNvSpPr>
+          <p:nvPr>
+            <p:ph type="sldImg"/>
+          </p:nvPr>
+        </p:nvSpPr>
+        <p:spPr/>
+      </p:sp>
+      <p:sp>
+        <p:nvSpPr>
+          <p:cNvPr id="3" name="Notes Placeholder 2"/>
+          <p:cNvSpPr>
+            <a:spLocks noGrp="1"/>
+          </p:cNvSpPr>
+          <p:nvPr>
+            <p:ph type="body" idx="1"/>
+          </p:nvPr>
+        </p:nvSpPr>
+        <p:spPr/>
+        <p:txBody>
+          <a:bodyPr/>
+          <a:lstStyle/>
+          <a:p>
+            <a:endParaRPr lang="en-GB"/>
+          </a:p>
+        </p:txBody>
+      </p:sp>
+      <p:sp>
+        <p:nvSpPr>
+          <p:cNvPr id="4" name="Slide Number Placeholder 3"/>
+          <p:cNvSpPr>
+            <a:spLocks noGrp="1"/>
+          </p:cNvSpPr>
+          <p:nvPr>
+            <p:ph type="sldNum" sz="quarter" idx="10"/>
+          </p:nvPr>
+        </p:nvSpPr>
+        <p:spPr/>
+        <p:txBody>
+          <a:bodyPr/>
+          <a:lstStyle/>
+          <a:p>
+            <a:fld id="{AE6C67D6-0A6E-460B-9D37-5356F858E280}" type="slidenum">
+              <a:rPr lang="en-GB" smtClean="0"/>
+              <a:t>11</a:t>
+            </a:fld>
+            <a:endParaRPr lang="en-GB"/>
+          </a:p>
+        </p:txBody>
+      </p:sp>
+    </p:spTree>
+    <p:extLst>
+      <p:ext uri="{BB962C8B-B14F-4D97-AF65-F5344CB8AC3E}">
+        <p14:creationId xmlns:p14="http://schemas.microsoft.com/office/powerpoint/2010/main" val="1951593419"/>
+      </p:ext>
+    </p:extLst>
+  </p:cSld>
+  <p:clrMapOvr>
+    <a:masterClrMapping/>
+  </p:clrMapOvr>
+</p:notes>
+</file>
+
+<file path=ppt/notesSlides/notesSlide2.xml><?xml version="1.0" encoding="utf-8"?>
+<p:notes xmlns:a="http://schemas.openxmlformats.org/drawingml/2006/main" xmlns:r="http://schemas.openxmlformats.org/officeDocument/2006/relationships" xmlns:p="http://schemas.openxmlformats.org/presentationml/2006/main">
+  <p:cSld>
+    <p:spTree>
+      <p:nvGrpSpPr>
+        <p:cNvPr id="1" name=""/>
+        <p:cNvGrpSpPr/>
+        <p:nvPr/>
+      </p:nvGrpSpPr>
+      <p:grpSpPr>
+        <a:xfrm>
+          <a:off x="0" y="0"/>
+          <a:ext cx="0" cy="0"/>
+          <a:chOff x="0" y="0"/>
+          <a:chExt cx="0" cy="0"/>
+        </a:xfrm>
+      </p:grpSpPr>
+      <p:sp>
+        <p:nvSpPr>
+          <p:cNvPr id="2" name="Slide Image Placeholder 1"/>
+          <p:cNvSpPr>
+            <a:spLocks noGrp="1" noRot="1" noChangeAspect="1"/>
+          </p:cNvSpPr>
+          <p:nvPr>
+            <p:ph type="sldImg"/>
+          </p:nvPr>
+        </p:nvSpPr>
+        <p:spPr/>
+      </p:sp>
+      <p:sp>
+        <p:nvSpPr>
+          <p:cNvPr id="3" name="Notes Placeholder 2"/>
+          <p:cNvSpPr>
+            <a:spLocks noGrp="1"/>
+          </p:cNvSpPr>
+          <p:nvPr>
+            <p:ph type="body" idx="1"/>
+          </p:nvPr>
+        </p:nvSpPr>
+        <p:spPr/>
+        <p:txBody>
+          <a:bodyPr/>
+          <a:lstStyle/>
+          <a:p>
+            <a:endParaRPr lang="en-GB"/>
+          </a:p>
+        </p:txBody>
+      </p:sp>
+      <p:sp>
+        <p:nvSpPr>
+          <p:cNvPr id="4" name="Slide Number Placeholder 3"/>
+          <p:cNvSpPr>
+            <a:spLocks noGrp="1"/>
+          </p:cNvSpPr>
+          <p:nvPr>
+            <p:ph type="sldNum" sz="quarter" idx="10"/>
+          </p:nvPr>
+        </p:nvSpPr>
+        <p:spPr/>
+        <p:txBody>
+          <a:bodyPr/>
+          <a:lstStyle/>
+          <a:p>
+            <a:fld id="{AE6C67D6-0A6E-460B-9D37-5356F858E280}" type="slidenum">
+              <a:rPr lang="en-GB" smtClean="0"/>
+              <a:t>2</a:t>
+            </a:fld>
+            <a:endParaRPr lang="en-GB"/>
+          </a:p>
+        </p:txBody>
+      </p:sp>
+    </p:spTree>
+    <p:extLst>
+      <p:ext uri="{BB962C8B-B14F-4D97-AF65-F5344CB8AC3E}">
+        <p14:creationId xmlns:p14="http://schemas.microsoft.com/office/powerpoint/2010/main" val="2111350014"/>
+      </p:ext>
+    </p:extLst>
+  </p:cSld>
+  <p:clrMapOvr>
+    <a:masterClrMapping/>
+  </p:clrMapOvr>
+</p:notes>
+</file>
+
+<file path=ppt/notesSlides/notesSlide3.xml><?xml version="1.0" encoding="utf-8"?>
+<p:notes xmlns:a="http://schemas.openxmlformats.org/drawingml/2006/main" xmlns:r="http://schemas.openxmlformats.org/officeDocument/2006/relationships" xmlns:p="http://schemas.openxmlformats.org/presentationml/2006/main">
+  <p:cSld>
+    <p:spTree>
+      <p:nvGrpSpPr>
+        <p:cNvPr id="1" name=""/>
+        <p:cNvGrpSpPr/>
+        <p:nvPr/>
+      </p:nvGrpSpPr>
+      <p:grpSpPr>
+        <a:xfrm>
+          <a:off x="0" y="0"/>
+          <a:ext cx="0" cy="0"/>
+          <a:chOff x="0" y="0"/>
+          <a:chExt cx="0" cy="0"/>
+        </a:xfrm>
+      </p:grpSpPr>
+      <p:sp>
+        <p:nvSpPr>
+          <p:cNvPr id="2" name="Slide Image Placeholder 1"/>
+          <p:cNvSpPr>
+            <a:spLocks noGrp="1" noRot="1" noChangeAspect="1"/>
+          </p:cNvSpPr>
+          <p:nvPr>
+            <p:ph type="sldImg"/>
+          </p:nvPr>
+        </p:nvSpPr>
+        <p:spPr/>
+      </p:sp>
+      <p:sp>
+        <p:nvSpPr>
+          <p:cNvPr id="3" name="Notes Placeholder 2"/>
+          <p:cNvSpPr>
+            <a:spLocks noGrp="1"/>
+          </p:cNvSpPr>
+          <p:nvPr>
+            <p:ph type="body" idx="1"/>
+          </p:nvPr>
+        </p:nvSpPr>
+        <p:spPr/>
+        <p:txBody>
+          <a:bodyPr/>
+          <a:lstStyle/>
+          <a:p>
+            <a:endParaRPr lang="en-GB"/>
+          </a:p>
+        </p:txBody>
+      </p:sp>
+      <p:sp>
+        <p:nvSpPr>
+          <p:cNvPr id="4" name="Slide Number Placeholder 3"/>
+          <p:cNvSpPr>
+            <a:spLocks noGrp="1"/>
+          </p:cNvSpPr>
+          <p:nvPr>
+            <p:ph type="sldNum" sz="quarter" idx="10"/>
+          </p:nvPr>
+        </p:nvSpPr>
+        <p:spPr/>
+        <p:txBody>
+          <a:bodyPr/>
+          <a:lstStyle/>
+          <a:p>
+            <a:fld id="{AE6C67D6-0A6E-460B-9D37-5356F858E280}" type="slidenum">
+              <a:rPr lang="en-GB" smtClean="0"/>
+              <a:t>3</a:t>
+            </a:fld>
+            <a:endParaRPr lang="en-GB"/>
+          </a:p>
+        </p:txBody>
+      </p:sp>
+    </p:spTree>
+    <p:extLst>
+      <p:ext uri="{BB962C8B-B14F-4D97-AF65-F5344CB8AC3E}">
+        <p14:creationId xmlns:p14="http://schemas.microsoft.com/office/powerpoint/2010/main" val="4168477060"/>
+      </p:ext>
+    </p:extLst>
+  </p:cSld>
+  <p:clrMapOvr>
+    <a:masterClrMapping/>
+  </p:clrMapOvr>
+</p:notes>
+</file>
+
+<file path=ppt/notesSlides/notesSlide4.xml><?xml version="1.0" encoding="utf-8"?>
+<p:notes xmlns:a="http://schemas.openxmlformats.org/drawingml/2006/main" xmlns:r="http://schemas.openxmlformats.org/officeDocument/2006/relationships" xmlns:p="http://schemas.openxmlformats.org/presentationml/2006/main">
+  <p:cSld>
+    <p:spTree>
+      <p:nvGrpSpPr>
+        <p:cNvPr id="1" name=""/>
+        <p:cNvGrpSpPr/>
+        <p:nvPr/>
+      </p:nvGrpSpPr>
+      <p:grpSpPr>
+        <a:xfrm>
+          <a:off x="0" y="0"/>
+          <a:ext cx="0" cy="0"/>
+          <a:chOff x="0" y="0"/>
+          <a:chExt cx="0" cy="0"/>
+        </a:xfrm>
+      </p:grpSpPr>
+      <p:sp>
+        <p:nvSpPr>
+          <p:cNvPr id="2" name="Slide Image Placeholder 1"/>
+          <p:cNvSpPr>
+            <a:spLocks noGrp="1" noRot="1" noChangeAspect="1"/>
+          </p:cNvSpPr>
+          <p:nvPr>
+            <p:ph type="sldImg"/>
+          </p:nvPr>
+        </p:nvSpPr>
+        <p:spPr/>
+      </p:sp>
+      <p:sp>
+        <p:nvSpPr>
+          <p:cNvPr id="3" name="Notes Placeholder 2"/>
+          <p:cNvSpPr>
+            <a:spLocks noGrp="1"/>
+          </p:cNvSpPr>
+          <p:nvPr>
+            <p:ph type="body" idx="1"/>
+          </p:nvPr>
+        </p:nvSpPr>
+        <p:spPr/>
+        <p:txBody>
+          <a:bodyPr/>
+          <a:lstStyle/>
+          <a:p>
+            <a:endParaRPr lang="en-GB"/>
+          </a:p>
+        </p:txBody>
+      </p:sp>
+      <p:sp>
+        <p:nvSpPr>
+          <p:cNvPr id="4" name="Slide Number Placeholder 3"/>
+          <p:cNvSpPr>
+            <a:spLocks noGrp="1"/>
+          </p:cNvSpPr>
+          <p:nvPr>
+            <p:ph type="sldNum" sz="quarter" idx="10"/>
+          </p:nvPr>
+        </p:nvSpPr>
+        <p:spPr/>
+        <p:txBody>
+          <a:bodyPr/>
+          <a:lstStyle/>
+          <a:p>
+            <a:fld id="{AE6C67D6-0A6E-460B-9D37-5356F858E280}" type="slidenum">
+              <a:rPr lang="en-GB" smtClean="0"/>
+              <a:t>4</a:t>
+            </a:fld>
+            <a:endParaRPr lang="en-GB"/>
+          </a:p>
+        </p:txBody>
+      </p:sp>
+    </p:spTree>
+    <p:extLst>
+      <p:ext uri="{BB962C8B-B14F-4D97-AF65-F5344CB8AC3E}">
+        <p14:creationId xmlns:p14="http://schemas.microsoft.com/office/powerpoint/2010/main" val="228459474"/>
+      </p:ext>
+    </p:extLst>
+  </p:cSld>
+  <p:clrMapOvr>
+    <a:masterClrMapping/>
+  </p:clrMapOvr>
+</p:notes>
+</file>
+
+<file path=ppt/notesSlides/notesSlide5.xml><?xml version="1.0" encoding="utf-8"?>
+<p:notes xmlns:a="http://schemas.openxmlformats.org/drawingml/2006/main" xmlns:r="http://schemas.openxmlformats.org/officeDocument/2006/relationships" xmlns:p="http://schemas.openxmlformats.org/presentationml/2006/main">
+  <p:cSld>
+    <p:spTree>
+      <p:nvGrpSpPr>
+        <p:cNvPr id="1" name=""/>
+        <p:cNvGrpSpPr/>
+        <p:nvPr/>
+      </p:nvGrpSpPr>
+      <p:grpSpPr>
+        <a:xfrm>
+          <a:off x="0" y="0"/>
+          <a:ext cx="0" cy="0"/>
+          <a:chOff x="0" y="0"/>
+          <a:chExt cx="0" cy="0"/>
+        </a:xfrm>
+      </p:grpSpPr>
+      <p:sp>
+        <p:nvSpPr>
+          <p:cNvPr id="2" name="Slide Image Placeholder 1"/>
+          <p:cNvSpPr>
+            <a:spLocks noGrp="1" noRot="1" noChangeAspect="1"/>
+          </p:cNvSpPr>
+          <p:nvPr>
+            <p:ph type="sldImg"/>
+          </p:nvPr>
+        </p:nvSpPr>
+        <p:spPr/>
+      </p:sp>
+      <p:sp>
+        <p:nvSpPr>
+          <p:cNvPr id="3" name="Notes Placeholder 2"/>
+          <p:cNvSpPr>
+            <a:spLocks noGrp="1"/>
+          </p:cNvSpPr>
+          <p:nvPr>
+            <p:ph type="body" idx="1"/>
+          </p:nvPr>
+        </p:nvSpPr>
+        <p:spPr/>
+        <p:txBody>
+          <a:bodyPr/>
+          <a:lstStyle/>
+          <a:p>
+            <a:endParaRPr lang="en-GB"/>
+          </a:p>
+        </p:txBody>
+      </p:sp>
+      <p:sp>
+        <p:nvSpPr>
+          <p:cNvPr id="4" name="Slide Number Placeholder 3"/>
+          <p:cNvSpPr>
+            <a:spLocks noGrp="1"/>
+          </p:cNvSpPr>
+          <p:nvPr>
+            <p:ph type="sldNum" sz="quarter" idx="10"/>
+          </p:nvPr>
+        </p:nvSpPr>
+        <p:spPr/>
+        <p:txBody>
+          <a:bodyPr/>
+          <a:lstStyle/>
+          <a:p>
+            <a:fld id="{AE6C67D6-0A6E-460B-9D37-5356F858E280}" type="slidenum">
+              <a:rPr lang="en-GB" smtClean="0"/>
+              <a:t>5</a:t>
+            </a:fld>
+            <a:endParaRPr lang="en-GB"/>
+          </a:p>
+        </p:txBody>
+      </p:sp>
+    </p:spTree>
+    <p:extLst>
+      <p:ext uri="{BB962C8B-B14F-4D97-AF65-F5344CB8AC3E}">
+        <p14:creationId xmlns:p14="http://schemas.microsoft.com/office/powerpoint/2010/main" val="2802711563"/>
+      </p:ext>
+    </p:extLst>
+  </p:cSld>
+  <p:clrMapOvr>
+    <a:masterClrMapping/>
+  </p:clrMapOvr>
+</p:notes>
+</file>
+
+<file path=ppt/notesSlides/notesSlide6.xml><?xml version="1.0" encoding="utf-8"?>
+<p:notes xmlns:a="http://schemas.openxmlformats.org/drawingml/2006/main" xmlns:r="http://schemas.openxmlformats.org/officeDocument/2006/relationships" xmlns:p="http://schemas.openxmlformats.org/presentationml/2006/main">
+  <p:cSld>
+    <p:spTree>
+      <p:nvGrpSpPr>
+        <p:cNvPr id="1" name=""/>
+        <p:cNvGrpSpPr/>
+        <p:nvPr/>
+      </p:nvGrpSpPr>
+      <p:grpSpPr>
+        <a:xfrm>
+          <a:off x="0" y="0"/>
+          <a:ext cx="0" cy="0"/>
+          <a:chOff x="0" y="0"/>
+          <a:chExt cx="0" cy="0"/>
+        </a:xfrm>
+      </p:grpSpPr>
+      <p:sp>
+        <p:nvSpPr>
+          <p:cNvPr id="2" name="Slide Image Placeholder 1"/>
+          <p:cNvSpPr>
+            <a:spLocks noGrp="1" noRot="1" noChangeAspect="1"/>
+          </p:cNvSpPr>
+          <p:nvPr>
+            <p:ph type="sldImg"/>
+          </p:nvPr>
+        </p:nvSpPr>
+        <p:spPr/>
+      </p:sp>
+      <p:sp>
+        <p:nvSpPr>
+          <p:cNvPr id="3" name="Notes Placeholder 2"/>
+          <p:cNvSpPr>
+            <a:spLocks noGrp="1"/>
+          </p:cNvSpPr>
+          <p:nvPr>
+            <p:ph type="body" idx="1"/>
+          </p:nvPr>
+        </p:nvSpPr>
+        <p:spPr/>
+        <p:txBody>
+          <a:bodyPr/>
+          <a:lstStyle/>
+          <a:p>
+            <a:endParaRPr lang="en-GB"/>
+          </a:p>
+        </p:txBody>
+      </p:sp>
+      <p:sp>
+        <p:nvSpPr>
+          <p:cNvPr id="4" name="Slide Number Placeholder 3"/>
+          <p:cNvSpPr>
+            <a:spLocks noGrp="1"/>
+          </p:cNvSpPr>
+          <p:nvPr>
+            <p:ph type="sldNum" sz="quarter" idx="10"/>
+          </p:nvPr>
+        </p:nvSpPr>
+        <p:spPr/>
+        <p:txBody>
+          <a:bodyPr/>
+          <a:lstStyle/>
+          <a:p>
+            <a:fld id="{AE6C67D6-0A6E-460B-9D37-5356F858E280}" type="slidenum">
+              <a:rPr lang="en-GB" smtClean="0"/>
               <a:t>6</a:t>
             </a:fld>
             <a:endParaRPr lang="en-GB"/>
@@ -558,6 +1143,258 @@
     <p:extLst>
       <p:ext uri="{BB962C8B-B14F-4D97-AF65-F5344CB8AC3E}">
         <p14:creationId xmlns:p14="http://schemas.microsoft.com/office/powerpoint/2010/main" val="3191813241"/>
+      </p:ext>
+    </p:extLst>
+  </p:cSld>
+  <p:clrMapOvr>
+    <a:masterClrMapping/>
+  </p:clrMapOvr>
+</p:notes>
+</file>
+
+<file path=ppt/notesSlides/notesSlide7.xml><?xml version="1.0" encoding="utf-8"?>
+<p:notes xmlns:a="http://schemas.openxmlformats.org/drawingml/2006/main" xmlns:r="http://schemas.openxmlformats.org/officeDocument/2006/relationships" xmlns:p="http://schemas.openxmlformats.org/presentationml/2006/main">
+  <p:cSld>
+    <p:spTree>
+      <p:nvGrpSpPr>
+        <p:cNvPr id="1" name=""/>
+        <p:cNvGrpSpPr/>
+        <p:nvPr/>
+      </p:nvGrpSpPr>
+      <p:grpSpPr>
+        <a:xfrm>
+          <a:off x="0" y="0"/>
+          <a:ext cx="0" cy="0"/>
+          <a:chOff x="0" y="0"/>
+          <a:chExt cx="0" cy="0"/>
+        </a:xfrm>
+      </p:grpSpPr>
+      <p:sp>
+        <p:nvSpPr>
+          <p:cNvPr id="2" name="Slide Image Placeholder 1"/>
+          <p:cNvSpPr>
+            <a:spLocks noGrp="1" noRot="1" noChangeAspect="1"/>
+          </p:cNvSpPr>
+          <p:nvPr>
+            <p:ph type="sldImg"/>
+          </p:nvPr>
+        </p:nvSpPr>
+        <p:spPr/>
+      </p:sp>
+      <p:sp>
+        <p:nvSpPr>
+          <p:cNvPr id="3" name="Notes Placeholder 2"/>
+          <p:cNvSpPr>
+            <a:spLocks noGrp="1"/>
+          </p:cNvSpPr>
+          <p:nvPr>
+            <p:ph type="body" idx="1"/>
+          </p:nvPr>
+        </p:nvSpPr>
+        <p:spPr/>
+        <p:txBody>
+          <a:bodyPr/>
+          <a:lstStyle/>
+          <a:p>
+            <a:endParaRPr lang="en-GB"/>
+          </a:p>
+        </p:txBody>
+      </p:sp>
+      <p:sp>
+        <p:nvSpPr>
+          <p:cNvPr id="4" name="Slide Number Placeholder 3"/>
+          <p:cNvSpPr>
+            <a:spLocks noGrp="1"/>
+          </p:cNvSpPr>
+          <p:nvPr>
+            <p:ph type="sldNum" sz="quarter" idx="10"/>
+          </p:nvPr>
+        </p:nvSpPr>
+        <p:spPr/>
+        <p:txBody>
+          <a:bodyPr/>
+          <a:lstStyle/>
+          <a:p>
+            <a:fld id="{AE6C67D6-0A6E-460B-9D37-5356F858E280}" type="slidenum">
+              <a:rPr lang="en-GB" smtClean="0"/>
+              <a:t>7</a:t>
+            </a:fld>
+            <a:endParaRPr lang="en-GB"/>
+          </a:p>
+        </p:txBody>
+      </p:sp>
+    </p:spTree>
+    <p:extLst>
+      <p:ext uri="{BB962C8B-B14F-4D97-AF65-F5344CB8AC3E}">
+        <p14:creationId xmlns:p14="http://schemas.microsoft.com/office/powerpoint/2010/main" val="3801706425"/>
+      </p:ext>
+    </p:extLst>
+  </p:cSld>
+  <p:clrMapOvr>
+    <a:masterClrMapping/>
+  </p:clrMapOvr>
+</p:notes>
+</file>
+
+<file path=ppt/notesSlides/notesSlide8.xml><?xml version="1.0" encoding="utf-8"?>
+<p:notes xmlns:a="http://schemas.openxmlformats.org/drawingml/2006/main" xmlns:r="http://schemas.openxmlformats.org/officeDocument/2006/relationships" xmlns:p="http://schemas.openxmlformats.org/presentationml/2006/main">
+  <p:cSld>
+    <p:spTree>
+      <p:nvGrpSpPr>
+        <p:cNvPr id="1" name=""/>
+        <p:cNvGrpSpPr/>
+        <p:nvPr/>
+      </p:nvGrpSpPr>
+      <p:grpSpPr>
+        <a:xfrm>
+          <a:off x="0" y="0"/>
+          <a:ext cx="0" cy="0"/>
+          <a:chOff x="0" y="0"/>
+          <a:chExt cx="0" cy="0"/>
+        </a:xfrm>
+      </p:grpSpPr>
+      <p:sp>
+        <p:nvSpPr>
+          <p:cNvPr id="2" name="Slide Image Placeholder 1"/>
+          <p:cNvSpPr>
+            <a:spLocks noGrp="1" noRot="1" noChangeAspect="1"/>
+          </p:cNvSpPr>
+          <p:nvPr>
+            <p:ph type="sldImg"/>
+          </p:nvPr>
+        </p:nvSpPr>
+        <p:spPr/>
+      </p:sp>
+      <p:sp>
+        <p:nvSpPr>
+          <p:cNvPr id="3" name="Notes Placeholder 2"/>
+          <p:cNvSpPr>
+            <a:spLocks noGrp="1"/>
+          </p:cNvSpPr>
+          <p:nvPr>
+            <p:ph type="body" idx="1"/>
+          </p:nvPr>
+        </p:nvSpPr>
+        <p:spPr/>
+        <p:txBody>
+          <a:bodyPr/>
+          <a:lstStyle/>
+          <a:p>
+            <a:endParaRPr lang="en-GB"/>
+          </a:p>
+        </p:txBody>
+      </p:sp>
+      <p:sp>
+        <p:nvSpPr>
+          <p:cNvPr id="4" name="Slide Number Placeholder 3"/>
+          <p:cNvSpPr>
+            <a:spLocks noGrp="1"/>
+          </p:cNvSpPr>
+          <p:nvPr>
+            <p:ph type="sldNum" sz="quarter" idx="10"/>
+          </p:nvPr>
+        </p:nvSpPr>
+        <p:spPr/>
+        <p:txBody>
+          <a:bodyPr/>
+          <a:lstStyle/>
+          <a:p>
+            <a:fld id="{AE6C67D6-0A6E-460B-9D37-5356F858E280}" type="slidenum">
+              <a:rPr lang="en-GB" smtClean="0"/>
+              <a:t>8</a:t>
+            </a:fld>
+            <a:endParaRPr lang="en-GB"/>
+          </a:p>
+        </p:txBody>
+      </p:sp>
+    </p:spTree>
+    <p:extLst>
+      <p:ext uri="{BB962C8B-B14F-4D97-AF65-F5344CB8AC3E}">
+        <p14:creationId xmlns:p14="http://schemas.microsoft.com/office/powerpoint/2010/main" val="3737651375"/>
+      </p:ext>
+    </p:extLst>
+  </p:cSld>
+  <p:clrMapOvr>
+    <a:masterClrMapping/>
+  </p:clrMapOvr>
+</p:notes>
+</file>
+
+<file path=ppt/notesSlides/notesSlide9.xml><?xml version="1.0" encoding="utf-8"?>
+<p:notes xmlns:a="http://schemas.openxmlformats.org/drawingml/2006/main" xmlns:r="http://schemas.openxmlformats.org/officeDocument/2006/relationships" xmlns:p="http://schemas.openxmlformats.org/presentationml/2006/main">
+  <p:cSld>
+    <p:spTree>
+      <p:nvGrpSpPr>
+        <p:cNvPr id="1" name=""/>
+        <p:cNvGrpSpPr/>
+        <p:nvPr/>
+      </p:nvGrpSpPr>
+      <p:grpSpPr>
+        <a:xfrm>
+          <a:off x="0" y="0"/>
+          <a:ext cx="0" cy="0"/>
+          <a:chOff x="0" y="0"/>
+          <a:chExt cx="0" cy="0"/>
+        </a:xfrm>
+      </p:grpSpPr>
+      <p:sp>
+        <p:nvSpPr>
+          <p:cNvPr id="2" name="Slide Image Placeholder 1"/>
+          <p:cNvSpPr>
+            <a:spLocks noGrp="1" noRot="1" noChangeAspect="1"/>
+          </p:cNvSpPr>
+          <p:nvPr>
+            <p:ph type="sldImg"/>
+          </p:nvPr>
+        </p:nvSpPr>
+        <p:spPr/>
+      </p:sp>
+      <p:sp>
+        <p:nvSpPr>
+          <p:cNvPr id="3" name="Notes Placeholder 2"/>
+          <p:cNvSpPr>
+            <a:spLocks noGrp="1"/>
+          </p:cNvSpPr>
+          <p:nvPr>
+            <p:ph type="body" idx="1"/>
+          </p:nvPr>
+        </p:nvSpPr>
+        <p:spPr/>
+        <p:txBody>
+          <a:bodyPr/>
+          <a:lstStyle/>
+          <a:p>
+            <a:endParaRPr lang="en-GB"/>
+          </a:p>
+        </p:txBody>
+      </p:sp>
+      <p:sp>
+        <p:nvSpPr>
+          <p:cNvPr id="4" name="Slide Number Placeholder 3"/>
+          <p:cNvSpPr>
+            <a:spLocks noGrp="1"/>
+          </p:cNvSpPr>
+          <p:nvPr>
+            <p:ph type="sldNum" sz="quarter" idx="10"/>
+          </p:nvPr>
+        </p:nvSpPr>
+        <p:spPr/>
+        <p:txBody>
+          <a:bodyPr/>
+          <a:lstStyle/>
+          <a:p>
+            <a:fld id="{AE6C67D6-0A6E-460B-9D37-5356F858E280}" type="slidenum">
+              <a:rPr lang="en-GB" smtClean="0"/>
+              <a:t>9</a:t>
+            </a:fld>
+            <a:endParaRPr lang="en-GB"/>
+          </a:p>
+        </p:txBody>
+      </p:sp>
+    </p:spTree>
+    <p:extLst>
+      <p:ext uri="{BB962C8B-B14F-4D97-AF65-F5344CB8AC3E}">
+        <p14:creationId xmlns:p14="http://schemas.microsoft.com/office/powerpoint/2010/main" val="1555760855"/>
       </p:ext>
     </p:extLst>
   </p:cSld>
@@ -698,7 +1535,7 @@
           <a:p>
             <a:fld id="{A92CA871-C039-4148-950E-2A9442B5BAA7}" type="datetimeFigureOut">
               <a:rPr lang="en-GB" smtClean="0"/>
-              <a:t>22/09/2017</a:t>
+              <a:t>28/09/2018</a:t>
             </a:fld>
             <a:endParaRPr lang="en-GB"/>
           </a:p>
@@ -868,7 +1705,7 @@
           <a:p>
             <a:fld id="{A92CA871-C039-4148-950E-2A9442B5BAA7}" type="datetimeFigureOut">
               <a:rPr lang="en-GB" smtClean="0"/>
-              <a:t>22/09/2017</a:t>
+              <a:t>28/09/2018</a:t>
             </a:fld>
             <a:endParaRPr lang="en-GB"/>
           </a:p>
@@ -1048,7 +1885,7 @@
           <a:p>
             <a:fld id="{A92CA871-C039-4148-950E-2A9442B5BAA7}" type="datetimeFigureOut">
               <a:rPr lang="en-GB" smtClean="0"/>
-              <a:t>22/09/2017</a:t>
+              <a:t>28/09/2018</a:t>
             </a:fld>
             <a:endParaRPr lang="en-GB"/>
           </a:p>
@@ -1218,7 +2055,7 @@
           <a:p>
             <a:fld id="{A92CA871-C039-4148-950E-2A9442B5BAA7}" type="datetimeFigureOut">
               <a:rPr lang="en-GB" smtClean="0"/>
-              <a:t>22/09/2017</a:t>
+              <a:t>28/09/2018</a:t>
             </a:fld>
             <a:endParaRPr lang="en-GB"/>
           </a:p>
@@ -1462,7 +2299,7 @@
           <a:p>
             <a:fld id="{A92CA871-C039-4148-950E-2A9442B5BAA7}" type="datetimeFigureOut">
               <a:rPr lang="en-GB" smtClean="0"/>
-              <a:t>22/09/2017</a:t>
+              <a:t>28/09/2018</a:t>
             </a:fld>
             <a:endParaRPr lang="en-GB"/>
           </a:p>
@@ -1694,7 +2531,7 @@
           <a:p>
             <a:fld id="{A92CA871-C039-4148-950E-2A9442B5BAA7}" type="datetimeFigureOut">
               <a:rPr lang="en-GB" smtClean="0"/>
-              <a:t>22/09/2017</a:t>
+              <a:t>28/09/2018</a:t>
             </a:fld>
             <a:endParaRPr lang="en-GB"/>
           </a:p>
@@ -2061,7 +2898,7 @@
           <a:p>
             <a:fld id="{A92CA871-C039-4148-950E-2A9442B5BAA7}" type="datetimeFigureOut">
               <a:rPr lang="en-GB" smtClean="0"/>
-              <a:t>22/09/2017</a:t>
+              <a:t>28/09/2018</a:t>
             </a:fld>
             <a:endParaRPr lang="en-GB"/>
           </a:p>
@@ -2179,7 +3016,7 @@
           <a:p>
             <a:fld id="{A92CA871-C039-4148-950E-2A9442B5BAA7}" type="datetimeFigureOut">
               <a:rPr lang="en-GB" smtClean="0"/>
-              <a:t>22/09/2017</a:t>
+              <a:t>28/09/2018</a:t>
             </a:fld>
             <a:endParaRPr lang="en-GB"/>
           </a:p>
@@ -2274,7 +3111,7 @@
           <a:p>
             <a:fld id="{A92CA871-C039-4148-950E-2A9442B5BAA7}" type="datetimeFigureOut">
               <a:rPr lang="en-GB" smtClean="0"/>
-              <a:t>22/09/2017</a:t>
+              <a:t>28/09/2018</a:t>
             </a:fld>
             <a:endParaRPr lang="en-GB"/>
           </a:p>
@@ -2551,7 +3388,7 @@
           <a:p>
             <a:fld id="{A92CA871-C039-4148-950E-2A9442B5BAA7}" type="datetimeFigureOut">
               <a:rPr lang="en-GB" smtClean="0"/>
-              <a:t>22/09/2017</a:t>
+              <a:t>28/09/2018</a:t>
             </a:fld>
             <a:endParaRPr lang="en-GB"/>
           </a:p>
@@ -2808,7 +3645,7 @@
           <a:p>
             <a:fld id="{A92CA871-C039-4148-950E-2A9442B5BAA7}" type="datetimeFigureOut">
               <a:rPr lang="en-GB" smtClean="0"/>
-              <a:t>22/09/2017</a:t>
+              <a:t>28/09/2018</a:t>
             </a:fld>
             <a:endParaRPr lang="en-GB"/>
           </a:p>
@@ -3021,7 +3858,7 @@
           <a:p>
             <a:fld id="{A92CA871-C039-4148-950E-2A9442B5BAA7}" type="datetimeFigureOut">
               <a:rPr lang="en-GB" smtClean="0"/>
-              <a:t>22/09/2017</a:t>
+              <a:t>28/09/2018</a:t>
             </a:fld>
             <a:endParaRPr lang="en-GB"/>
           </a:p>
@@ -3541,7 +4378,7 @@
           <p:nvPr/>
         </p:nvPicPr>
         <p:blipFill rotWithShape="1">
-          <a:blip r:embed="rId2"/>
+          <a:blip r:embed="rId3"/>
           <a:srcRect l="8192" t="22774" r="9273" b="3576"/>
           <a:stretch/>
         </p:blipFill>
@@ -3664,12 +4501,12 @@
               <a:t>FFT, logic, </a:t>
             </a:r>
             <a:r>
-              <a:rPr lang="en-GB" dirty="0" err="1" smtClean="0"/>
-              <a:t>matricies</a:t>
-            </a:r>
-            <a:r>
-              <a:rPr lang="en-GB" dirty="0" smtClean="0"/>
-              <a:t>, sorting and searching…</a:t>
+              <a:rPr lang="en-GB" dirty="0" smtClean="0"/>
+              <a:t>matrices, </a:t>
+            </a:r>
+            <a:r>
+              <a:rPr lang="en-GB" dirty="0" smtClean="0"/>
+              <a:t>sorting and searching…</a:t>
             </a:r>
           </a:p>
           <a:p>
@@ -4048,24 +4885,48 @@
             </a:r>
             <a:r>
               <a:rPr lang="en-GB" dirty="0" smtClean="0"/>
-              <a:t>) </a:t>
-            </a:r>
-            <a:r>
-              <a:rPr lang="en-GB" dirty="0"/>
-              <a:t>notebooks, (IDLE</a:t>
-            </a:r>
-            <a:r>
-              <a:rPr lang="en-GB" dirty="0" smtClean="0"/>
-              <a:t>)</a:t>
-            </a:r>
-            <a:endParaRPr lang="en-GB" dirty="0"/>
+              <a:t>) notebooks, (IDLE)</a:t>
+            </a:r>
+          </a:p>
+          <a:p>
+            <a:r>
+              <a:rPr lang="en-GB" dirty="0" smtClean="0"/>
+              <a:t>Fully fledged IDE’s</a:t>
+            </a:r>
+          </a:p>
+          <a:p>
+            <a:pPr lvl="1"/>
+            <a:r>
+              <a:rPr lang="en-GB" dirty="0" smtClean="0"/>
+              <a:t>Built in debuggers, performance monitoring, integration with many programming tools – complex!</a:t>
+            </a:r>
+          </a:p>
+          <a:p>
+            <a:pPr lvl="1"/>
+            <a:r>
+              <a:rPr lang="en-GB" dirty="0" smtClean="0"/>
+              <a:t>Recommend </a:t>
+            </a:r>
+            <a:r>
+              <a:rPr lang="en-GB" dirty="0" err="1" smtClean="0"/>
+              <a:t>spyder</a:t>
+            </a:r>
+            <a:r>
+              <a:rPr lang="en-GB" dirty="0" smtClean="0"/>
+              <a:t>/</a:t>
+            </a:r>
+            <a:r>
+              <a:rPr lang="en-GB" dirty="0" err="1" smtClean="0"/>
+              <a:t>PyCharm</a:t>
+            </a:r>
+            <a:endParaRPr lang="en-GB" dirty="0" smtClean="0"/>
           </a:p>
         </p:txBody>
       </p:sp>
     </p:spTree>
     <p:extLst>
       <p:ext uri="{BB962C8B-B14F-4D97-AF65-F5344CB8AC3E}">
-        <p14:creationId xmlns:p14="http://schemas.microsoft.com/office/powerpoint/2010/main" val="3123462150"/>
+        <p14:creationId xmlns:p14="http://schemas.microsoft.com/office/powerpoint/2010/main" val="1568215629"/>
       </p:ext>
     </p:extLst>
   </p:cSld>
@@ -4118,7 +4979,7 @@
           <a:p>
             <a:r>
               <a:rPr lang="en-GB" dirty="0" smtClean="0"/>
-              <a:t>Integrated Development Environments (IDEs)</a:t>
+              <a:t>Where to go for help</a:t>
             </a:r>
             <a:endParaRPr lang="en-GB" dirty="0"/>
           </a:p>
@@ -4136,87 +4997,184 @@
         </p:nvSpPr>
         <p:spPr>
           <a:xfrm>
-            <a:off x="628650" y="1825625"/>
-            <a:ext cx="7886700" cy="4351338"/>
+            <a:off x="628649" y="1825625"/>
+            <a:ext cx="8054031" cy="4351338"/>
           </a:xfrm>
         </p:spPr>
         <p:txBody>
-          <a:bodyPr/>
-          <a:lstStyle/>
-          <a:p>
-            <a:r>
-              <a:rPr lang="en-GB" dirty="0" smtClean="0"/>
-              <a:t>Python can be written in the simplest text editor</a:t>
+          <a:bodyPr>
+            <a:normAutofit/>
+          </a:bodyPr>
+          <a:lstStyle/>
+          <a:p>
+            <a:r>
+              <a:rPr lang="en-GB" sz="2400" dirty="0"/>
+              <a:t>Python </a:t>
+            </a:r>
+            <a:r>
+              <a:rPr lang="en-GB" sz="2400" dirty="0" smtClean="0"/>
+              <a:t>documentation</a:t>
             </a:r>
           </a:p>
           <a:p>
             <a:pPr lvl="1"/>
             <a:r>
-              <a:rPr lang="en-GB" dirty="0" smtClean="0"/>
-              <a:t>E.g. Notepad (Though I recommend Notepad++ for Windows and Atom for Unix)</a:t>
-            </a:r>
-          </a:p>
-          <a:p>
-            <a:r>
-              <a:rPr lang="en-GB" dirty="0" smtClean="0"/>
-              <a:t>Intermediate IDE’s provide some extra functions</a:t>
+              <a:rPr lang="en-GB" sz="1800" dirty="0" smtClean="0">
+                <a:hlinkClick r:id="rId2"/>
+              </a:rPr>
+              <a:t>https</a:t>
+            </a:r>
+            <a:r>
+              <a:rPr lang="en-GB" sz="1800" dirty="0">
+                <a:hlinkClick r:id="rId2"/>
+              </a:rPr>
+              <a:t>://docs.python.org/3</a:t>
+            </a:r>
+            <a:r>
+              <a:rPr lang="en-GB" sz="1800" dirty="0" smtClean="0">
+                <a:hlinkClick r:id="rId2"/>
+              </a:rPr>
+              <a:t>/</a:t>
+            </a:r>
+            <a:endParaRPr lang="en-GB" sz="1800" dirty="0" smtClean="0"/>
+          </a:p>
+          <a:p>
+            <a:r>
+              <a:rPr lang="en-GB" sz="2400" dirty="0" err="1" smtClean="0"/>
+              <a:t>Numpy</a:t>
+            </a:r>
+            <a:r>
+              <a:rPr lang="en-GB" sz="2400" dirty="0" smtClean="0"/>
+              <a:t>/</a:t>
+            </a:r>
+            <a:r>
+              <a:rPr lang="en-GB" sz="2400" dirty="0" err="1" smtClean="0"/>
+              <a:t>Scipy</a:t>
+            </a:r>
+            <a:r>
+              <a:rPr lang="en-GB" sz="2400" dirty="0" smtClean="0"/>
+              <a:t> documentation</a:t>
             </a:r>
           </a:p>
           <a:p>
             <a:pPr lvl="1"/>
             <a:r>
-              <a:rPr lang="en-GB" dirty="0" smtClean="0"/>
-              <a:t>Inline code running, saves variables in background</a:t>
+              <a:rPr lang="en-GB" sz="1800" dirty="0" smtClean="0">
+                <a:hlinkClick r:id="rId3"/>
+              </a:rPr>
+              <a:t>https</a:t>
+            </a:r>
+            <a:r>
+              <a:rPr lang="en-GB" sz="1800" dirty="0">
+                <a:hlinkClick r:id="rId3"/>
+              </a:rPr>
+              <a:t>://docs.scipy.org/doc/numpy</a:t>
+            </a:r>
+            <a:r>
+              <a:rPr lang="en-GB" sz="1800" dirty="0" smtClean="0">
+                <a:hlinkClick r:id="rId3"/>
+              </a:rPr>
+              <a:t>/</a:t>
+            </a:r>
+            <a:r>
+              <a:rPr lang="en-GB" sz="1800" dirty="0" smtClean="0"/>
+              <a:t> </a:t>
             </a:r>
           </a:p>
           <a:p>
             <a:pPr lvl="1"/>
             <a:r>
-              <a:rPr lang="en-GB" dirty="0" err="1" smtClean="0"/>
-              <a:t>Jupyter</a:t>
-            </a:r>
-            <a:r>
-              <a:rPr lang="en-GB" dirty="0" smtClean="0"/>
-              <a:t> (formerly </a:t>
-            </a:r>
-            <a:r>
-              <a:rPr lang="en-GB" dirty="0" err="1" smtClean="0"/>
-              <a:t>Ipython</a:t>
-            </a:r>
-            <a:r>
-              <a:rPr lang="en-GB" dirty="0" smtClean="0"/>
-              <a:t>) notebooks</a:t>
-            </a:r>
-          </a:p>
-        </p:txBody>
-      </p:sp>
-      <p:pic>
-        <p:nvPicPr>
-          <p:cNvPr id="3" name="Picture 2"/>
-          <p:cNvPicPr>
-            <a:picLocks noChangeAspect="1"/>
-          </p:cNvPicPr>
-          <p:nvPr/>
-        </p:nvPicPr>
-        <p:blipFill rotWithShape="1">
-          <a:blip r:embed="rId2"/>
-          <a:srcRect l="19163" t="6727" r="19833" b="23343"/>
-          <a:stretch/>
-        </p:blipFill>
-        <p:spPr>
-          <a:xfrm>
-            <a:off x="551934" y="1686770"/>
-            <a:ext cx="7963415" cy="4944690"/>
-          </a:xfrm>
-          <a:prstGeom prst="rect">
-            <a:avLst/>
-          </a:prstGeom>
-        </p:spPr>
-      </p:pic>
+              <a:rPr lang="en-GB" sz="1800" dirty="0">
+                <a:hlinkClick r:id="rId4"/>
+              </a:rPr>
+              <a:t>https://docs.scipy.org/doc/scipy/reference</a:t>
+            </a:r>
+            <a:r>
+              <a:rPr lang="en-GB" sz="1800" dirty="0" smtClean="0">
+                <a:hlinkClick r:id="rId4"/>
+              </a:rPr>
+              <a:t>/</a:t>
+            </a:r>
+            <a:r>
+              <a:rPr lang="en-GB" sz="1800" dirty="0" smtClean="0"/>
+              <a:t> </a:t>
+            </a:r>
+          </a:p>
+          <a:p>
+            <a:r>
+              <a:rPr lang="en-GB" sz="2400" dirty="0" smtClean="0"/>
+              <a:t>Google is your friend!</a:t>
+            </a:r>
+          </a:p>
+          <a:p>
+            <a:pPr lvl="1"/>
+            <a:r>
+              <a:rPr lang="en-GB" sz="1800" dirty="0" smtClean="0"/>
+              <a:t>Phrase questions carefully</a:t>
+            </a:r>
+          </a:p>
+          <a:p>
+            <a:pPr lvl="1"/>
+            <a:r>
+              <a:rPr lang="en-GB" sz="1800" dirty="0" smtClean="0"/>
+              <a:t>Stack Overflow</a:t>
+            </a:r>
+          </a:p>
+          <a:p>
+            <a:r>
+              <a:rPr lang="en-GB" sz="2400" dirty="0" smtClean="0"/>
+              <a:t>Many online tutorials, some better than others</a:t>
+            </a:r>
+          </a:p>
+          <a:p>
+            <a:r>
+              <a:rPr lang="en-GB" sz="2400" dirty="0" smtClean="0"/>
+              <a:t>Free </a:t>
+            </a:r>
+            <a:r>
+              <a:rPr lang="en-GB" sz="2400" dirty="0" err="1" smtClean="0"/>
+              <a:t>Ebooks</a:t>
+            </a:r>
+            <a:r>
+              <a:rPr lang="en-GB" sz="2400" dirty="0" smtClean="0"/>
+              <a:t> if you are that way inclined</a:t>
+            </a:r>
+          </a:p>
+          <a:p>
+            <a:pPr lvl="1"/>
+            <a:r>
+              <a:rPr lang="en-GB" sz="1800" dirty="0" smtClean="0"/>
+              <a:t>E.g. </a:t>
+            </a:r>
+            <a:r>
+              <a:rPr lang="en-GB" sz="1800" dirty="0" smtClean="0">
+                <a:hlinkClick r:id="rId5"/>
+              </a:rPr>
+              <a:t>https</a:t>
+            </a:r>
+            <a:r>
+              <a:rPr lang="en-GB" sz="1800" dirty="0">
+                <a:hlinkClick r:id="rId5"/>
+              </a:rPr>
+              <a:t>://</a:t>
+            </a:r>
+            <a:r>
+              <a:rPr lang="en-GB" sz="1800" dirty="0" smtClean="0">
+                <a:hlinkClick r:id="rId5"/>
+              </a:rPr>
+              <a:t>automatetheboringstuff.com/</a:t>
+            </a:r>
+            <a:r>
+              <a:rPr lang="en-GB" sz="1800" dirty="0" smtClean="0"/>
+              <a:t> </a:t>
+            </a:r>
+          </a:p>
+        </p:txBody>
+      </p:sp>
     </p:spTree>
     <p:extLst>
       <p:ext uri="{BB962C8B-B14F-4D97-AF65-F5344CB8AC3E}">
-        <p14:creationId xmlns:p14="http://schemas.microsoft.com/office/powerpoint/2010/main" val="3477057182"/>
+        <p14:creationId xmlns:p14="http://schemas.microsoft.com/office/powerpoint/2010/main" val="4169198258"/>
       </p:ext>
     </p:extLst>
   </p:cSld>
@@ -4262,14 +5220,12 @@
         </p:nvSpPr>
         <p:spPr/>
         <p:txBody>
-          <a:bodyPr>
-            <a:normAutofit/>
-          </a:bodyPr>
-          <a:lstStyle/>
-          <a:p>
-            <a:r>
-              <a:rPr lang="en-GB" dirty="0" smtClean="0"/>
-              <a:t>Integrated Development Environments (IDEs)</a:t>
+          <a:bodyPr/>
+          <a:lstStyle/>
+          <a:p>
+            <a:r>
+              <a:rPr lang="en-GB" dirty="0" smtClean="0"/>
+              <a:t>Course Outline</a:t>
             </a:r>
             <a:endParaRPr lang="en-GB" dirty="0"/>
           </a:p>
@@ -4297,612 +5253,43 @@
           <a:p>
             <a:r>
               <a:rPr lang="en-GB" dirty="0" smtClean="0"/>
-              <a:t>Python can be written in the simplest text editor</a:t>
+              <a:t>4 interactive workshops – little formal tuition, learn by doing</a:t>
             </a:r>
           </a:p>
           <a:p>
             <a:pPr lvl="1"/>
             <a:r>
               <a:rPr lang="en-GB" dirty="0" smtClean="0"/>
-              <a:t>E.g. Notepad (Though I recommend Notepad++ for Windows and Atom for Unix)</a:t>
-            </a:r>
-          </a:p>
-          <a:p>
-            <a:r>
-              <a:rPr lang="en-GB" dirty="0" smtClean="0"/>
-              <a:t>Intermediate IDE’s provide some extra functions</a:t>
+              <a:t>Help each other, some will have experience, some none at all</a:t>
+            </a:r>
+          </a:p>
+          <a:p>
+            <a:r>
+              <a:rPr lang="en-GB" dirty="0" smtClean="0"/>
+              <a:t>Everyone should complete the basic material</a:t>
             </a:r>
           </a:p>
           <a:p>
             <a:pPr lvl="1"/>
             <a:r>
               <a:rPr lang="en-GB" dirty="0" smtClean="0"/>
-              <a:t>Inline code execution, saves variables in background</a:t>
-            </a:r>
-          </a:p>
-          <a:p>
-            <a:pPr lvl="1"/>
-            <a:r>
-              <a:rPr lang="en-GB" dirty="0" err="1" smtClean="0"/>
-              <a:t>Jupyter</a:t>
-            </a:r>
-            <a:r>
-              <a:rPr lang="en-GB" dirty="0" smtClean="0"/>
-              <a:t> (formerly </a:t>
-            </a:r>
-            <a:r>
-              <a:rPr lang="en-GB" dirty="0" err="1" smtClean="0"/>
-              <a:t>Ipython</a:t>
-            </a:r>
-            <a:r>
-              <a:rPr lang="en-GB" dirty="0" smtClean="0"/>
-              <a:t>) notebooks, (IDLE)</a:t>
-            </a:r>
-          </a:p>
-          <a:p>
-            <a:r>
-              <a:rPr lang="en-GB" dirty="0" smtClean="0"/>
-              <a:t>Fully fledged IDE’s</a:t>
-            </a:r>
-          </a:p>
-          <a:p>
-            <a:pPr lvl="1"/>
-            <a:r>
-              <a:rPr lang="en-GB" dirty="0" smtClean="0"/>
-              <a:t>Built in debuggers, performance monitoring, integration with many programming tools – complex!</a:t>
-            </a:r>
-          </a:p>
-          <a:p>
-            <a:pPr lvl="1"/>
-            <a:r>
-              <a:rPr lang="en-GB" dirty="0" smtClean="0"/>
-              <a:t>Recommend </a:t>
-            </a:r>
-            <a:r>
-              <a:rPr lang="en-GB" dirty="0" err="1" smtClean="0"/>
-              <a:t>PyCharm</a:t>
+              <a:t>There are extension problems for those interested</a:t>
+            </a:r>
+          </a:p>
+          <a:p>
+            <a:r>
+              <a:rPr lang="en-GB" dirty="0"/>
+              <a:t>Later courses by Simon </a:t>
+            </a:r>
+            <a:r>
+              <a:rPr lang="en-GB" dirty="0" smtClean="0"/>
+              <a:t>Hanna and </a:t>
+            </a:r>
+            <a:r>
+              <a:rPr lang="en-GB" dirty="0"/>
+              <a:t>Paddy Royall cover more details of specific simulation techniques</a:t>
             </a:r>
             <a:endParaRPr lang="en-GB" dirty="0" smtClean="0"/>
-          </a:p>
-        </p:txBody>
-      </p:sp>
-    </p:spTree>
-    <p:extLst>
-      <p:ext uri="{BB962C8B-B14F-4D97-AF65-F5344CB8AC3E}">
-        <p14:creationId xmlns:p14="http://schemas.microsoft.com/office/powerpoint/2010/main" val="1568215629"/>
-      </p:ext>
-    </p:extLst>
-  </p:cSld>
-  <p:clrMapOvr>
-    <a:masterClrMapping/>
-  </p:clrMapOvr>
-  <p:timing>
-    <p:tnLst>
-      <p:par>
-        <p:cTn id="1" dur="indefinite" restart="never" nodeType="tmRoot"/>
-      </p:par>
-    </p:tnLst>
-  </p:timing>
-</p:sld>
-</file>
-
-<file path=ppt/slides/slide17.xml><?xml version="1.0" encoding="utf-8"?>
-<p:sld xmlns:a="http://schemas.openxmlformats.org/drawingml/2006/main" xmlns:r="http://schemas.openxmlformats.org/officeDocument/2006/relationships" xmlns:p="http://schemas.openxmlformats.org/presentationml/2006/main">
-  <p:cSld>
-    <p:spTree>
-      <p:nvGrpSpPr>
-        <p:cNvPr id="1" name=""/>
-        <p:cNvGrpSpPr/>
-        <p:nvPr/>
-      </p:nvGrpSpPr>
-      <p:grpSpPr>
-        <a:xfrm>
-          <a:off x="0" y="0"/>
-          <a:ext cx="0" cy="0"/>
-          <a:chOff x="0" y="0"/>
-          <a:chExt cx="0" cy="0"/>
-        </a:xfrm>
-      </p:grpSpPr>
-      <p:sp>
-        <p:nvSpPr>
-          <p:cNvPr id="2" name="Title 1"/>
-          <p:cNvSpPr>
-            <a:spLocks noGrp="1"/>
-          </p:cNvSpPr>
-          <p:nvPr>
-            <p:ph type="title"/>
-          </p:nvPr>
-        </p:nvSpPr>
-        <p:spPr/>
-        <p:txBody>
-          <a:bodyPr>
-            <a:normAutofit/>
-          </a:bodyPr>
-          <a:lstStyle/>
-          <a:p>
-            <a:r>
-              <a:rPr lang="en-GB" dirty="0" smtClean="0"/>
-              <a:t>Integrated Development Environments (IDEs)</a:t>
-            </a:r>
-            <a:endParaRPr lang="en-GB" dirty="0"/>
-          </a:p>
-        </p:txBody>
-      </p:sp>
-      <p:sp>
-        <p:nvSpPr>
-          <p:cNvPr id="4" name="Content Placeholder 2"/>
-          <p:cNvSpPr>
-            <a:spLocks noGrp="1"/>
-          </p:cNvSpPr>
-          <p:nvPr>
-            <p:ph idx="1"/>
-          </p:nvPr>
-        </p:nvSpPr>
-        <p:spPr>
-          <a:xfrm>
-            <a:off x="628650" y="1825625"/>
-            <a:ext cx="7886700" cy="4351338"/>
-          </a:xfrm>
-        </p:spPr>
-        <p:txBody>
-          <a:bodyPr/>
-          <a:lstStyle/>
-          <a:p>
-            <a:r>
-              <a:rPr lang="en-GB" dirty="0" smtClean="0"/>
-              <a:t>Python can be written in the simplest text editor</a:t>
-            </a:r>
-          </a:p>
-          <a:p>
-            <a:pPr lvl="1"/>
-            <a:r>
-              <a:rPr lang="en-GB" dirty="0" smtClean="0"/>
-              <a:t>E.g. Notepad (Though I recommend Notepad++ for Windows and Atom for Unix)</a:t>
-            </a:r>
-          </a:p>
-          <a:p>
-            <a:r>
-              <a:rPr lang="en-GB" dirty="0" smtClean="0"/>
-              <a:t>Intermediate IDE’s provide some extra functions</a:t>
-            </a:r>
-          </a:p>
-          <a:p>
-            <a:pPr lvl="1"/>
-            <a:r>
-              <a:rPr lang="en-GB" dirty="0" smtClean="0"/>
-              <a:t>Inline code running, saves variables in background</a:t>
-            </a:r>
-          </a:p>
-          <a:p>
-            <a:pPr lvl="1"/>
-            <a:r>
-              <a:rPr lang="en-GB" dirty="0" err="1" smtClean="0"/>
-              <a:t>Jupyter</a:t>
-            </a:r>
-            <a:r>
-              <a:rPr lang="en-GB" dirty="0" smtClean="0"/>
-              <a:t> (formerly </a:t>
-            </a:r>
-            <a:r>
-              <a:rPr lang="en-GB" dirty="0" err="1" smtClean="0"/>
-              <a:t>Ipython</a:t>
-            </a:r>
-            <a:r>
-              <a:rPr lang="en-GB" dirty="0" smtClean="0"/>
-              <a:t>) notebooks</a:t>
-            </a:r>
-          </a:p>
-          <a:p>
-            <a:r>
-              <a:rPr lang="en-GB" dirty="0" smtClean="0"/>
-              <a:t>Fully fledged IDE’s</a:t>
-            </a:r>
-          </a:p>
-          <a:p>
-            <a:pPr lvl="1"/>
-            <a:r>
-              <a:rPr lang="en-GB" dirty="0" smtClean="0"/>
-              <a:t>Built in debuggers, performance monitoring, integration with many programming tools – complex!</a:t>
-            </a:r>
-          </a:p>
-          <a:p>
-            <a:pPr lvl="1"/>
-            <a:r>
-              <a:rPr lang="en-GB" dirty="0" smtClean="0"/>
-              <a:t>Recommend </a:t>
-            </a:r>
-            <a:r>
-              <a:rPr lang="en-GB" dirty="0" err="1" smtClean="0"/>
-              <a:t>PyCharm</a:t>
-            </a:r>
-            <a:endParaRPr lang="en-GB" dirty="0" smtClean="0"/>
-          </a:p>
-        </p:txBody>
-      </p:sp>
-      <p:pic>
-        <p:nvPicPr>
-          <p:cNvPr id="3" name="Picture 2"/>
-          <p:cNvPicPr>
-            <a:picLocks noChangeAspect="1"/>
-          </p:cNvPicPr>
-          <p:nvPr/>
-        </p:nvPicPr>
-        <p:blipFill>
-          <a:blip r:embed="rId2"/>
-          <a:stretch>
-            <a:fillRect/>
-          </a:stretch>
-        </p:blipFill>
-        <p:spPr>
-          <a:xfrm>
-            <a:off x="0" y="1690689"/>
-            <a:ext cx="9163010" cy="4963297"/>
-          </a:xfrm>
-          <a:prstGeom prst="rect">
-            <a:avLst/>
-          </a:prstGeom>
-        </p:spPr>
-      </p:pic>
-    </p:spTree>
-    <p:extLst>
-      <p:ext uri="{BB962C8B-B14F-4D97-AF65-F5344CB8AC3E}">
-        <p14:creationId xmlns:p14="http://schemas.microsoft.com/office/powerpoint/2010/main" val="718663606"/>
-      </p:ext>
-    </p:extLst>
-  </p:cSld>
-  <p:clrMapOvr>
-    <a:masterClrMapping/>
-  </p:clrMapOvr>
-  <p:timing>
-    <p:tnLst>
-      <p:par>
-        <p:cTn id="1" dur="indefinite" restart="never" nodeType="tmRoot"/>
-      </p:par>
-    </p:tnLst>
-  </p:timing>
-</p:sld>
-</file>
-
-<file path=ppt/slides/slide18.xml><?xml version="1.0" encoding="utf-8"?>
-<p:sld xmlns:a="http://schemas.openxmlformats.org/drawingml/2006/main" xmlns:r="http://schemas.openxmlformats.org/officeDocument/2006/relationships" xmlns:p="http://schemas.openxmlformats.org/presentationml/2006/main">
-  <p:cSld>
-    <p:spTree>
-      <p:nvGrpSpPr>
-        <p:cNvPr id="1" name=""/>
-        <p:cNvGrpSpPr/>
-        <p:nvPr/>
-      </p:nvGrpSpPr>
-      <p:grpSpPr>
-        <a:xfrm>
-          <a:off x="0" y="0"/>
-          <a:ext cx="0" cy="0"/>
-          <a:chOff x="0" y="0"/>
-          <a:chExt cx="0" cy="0"/>
-        </a:xfrm>
-      </p:grpSpPr>
-      <p:sp>
-        <p:nvSpPr>
-          <p:cNvPr id="2" name="Title 1"/>
-          <p:cNvSpPr>
-            <a:spLocks noGrp="1"/>
-          </p:cNvSpPr>
-          <p:nvPr>
-            <p:ph type="title"/>
-          </p:nvPr>
-        </p:nvSpPr>
-        <p:spPr/>
-        <p:txBody>
-          <a:bodyPr>
-            <a:normAutofit/>
-          </a:bodyPr>
-          <a:lstStyle/>
-          <a:p>
-            <a:r>
-              <a:rPr lang="en-GB" dirty="0" smtClean="0"/>
-              <a:t>Where to go for help</a:t>
-            </a:r>
-            <a:endParaRPr lang="en-GB" dirty="0"/>
-          </a:p>
-        </p:txBody>
-      </p:sp>
-      <p:sp>
-        <p:nvSpPr>
-          <p:cNvPr id="4" name="Content Placeholder 2"/>
-          <p:cNvSpPr>
-            <a:spLocks noGrp="1"/>
-          </p:cNvSpPr>
-          <p:nvPr>
-            <p:ph idx="1"/>
-          </p:nvPr>
-        </p:nvSpPr>
-        <p:spPr>
-          <a:xfrm>
-            <a:off x="628649" y="1825625"/>
-            <a:ext cx="8054031" cy="4351338"/>
-          </a:xfrm>
-        </p:spPr>
-        <p:txBody>
-          <a:bodyPr>
-            <a:normAutofit/>
-          </a:bodyPr>
-          <a:lstStyle/>
-          <a:p>
-            <a:r>
-              <a:rPr lang="en-GB" sz="2400" dirty="0"/>
-              <a:t>Python </a:t>
-            </a:r>
-            <a:r>
-              <a:rPr lang="en-GB" sz="2400" dirty="0" smtClean="0"/>
-              <a:t>documentation</a:t>
-            </a:r>
-          </a:p>
-          <a:p>
-            <a:pPr lvl="1"/>
-            <a:r>
-              <a:rPr lang="en-GB" sz="1800" dirty="0" smtClean="0">
-                <a:hlinkClick r:id="rId2"/>
-              </a:rPr>
-              <a:t>https</a:t>
-            </a:r>
-            <a:r>
-              <a:rPr lang="en-GB" sz="1800" dirty="0">
-                <a:hlinkClick r:id="rId2"/>
-              </a:rPr>
-              <a:t>://docs.python.org/3</a:t>
-            </a:r>
-            <a:r>
-              <a:rPr lang="en-GB" sz="1800" dirty="0" smtClean="0">
-                <a:hlinkClick r:id="rId2"/>
-              </a:rPr>
-              <a:t>/</a:t>
-            </a:r>
-            <a:endParaRPr lang="en-GB" sz="1800" dirty="0" smtClean="0"/>
-          </a:p>
-          <a:p>
-            <a:r>
-              <a:rPr lang="en-GB" sz="2400" dirty="0" err="1" smtClean="0"/>
-              <a:t>Numpy</a:t>
-            </a:r>
-            <a:r>
-              <a:rPr lang="en-GB" sz="2400" dirty="0" smtClean="0"/>
-              <a:t>/</a:t>
-            </a:r>
-            <a:r>
-              <a:rPr lang="en-GB" sz="2400" dirty="0" err="1" smtClean="0"/>
-              <a:t>Scipy</a:t>
-            </a:r>
-            <a:r>
-              <a:rPr lang="en-GB" sz="2400" dirty="0" smtClean="0"/>
-              <a:t> documentation</a:t>
-            </a:r>
-          </a:p>
-          <a:p>
-            <a:pPr lvl="1"/>
-            <a:r>
-              <a:rPr lang="en-GB" sz="1800" dirty="0" smtClean="0"/>
-              <a:t> </a:t>
-            </a:r>
-            <a:r>
-              <a:rPr lang="en-GB" sz="1800" dirty="0">
-                <a:hlinkClick r:id="rId3"/>
-              </a:rPr>
-              <a:t>https://docs.scipy.org/doc/numpy</a:t>
-            </a:r>
-            <a:r>
-              <a:rPr lang="en-GB" sz="1800" dirty="0" smtClean="0">
-                <a:hlinkClick r:id="rId3"/>
-              </a:rPr>
-              <a:t>/</a:t>
-            </a:r>
-            <a:r>
-              <a:rPr lang="en-GB" sz="1800" dirty="0" smtClean="0"/>
-              <a:t> </a:t>
-            </a:r>
-          </a:p>
-          <a:p>
-            <a:pPr lvl="1"/>
-            <a:r>
-              <a:rPr lang="en-GB" sz="1800" dirty="0">
-                <a:hlinkClick r:id="rId4"/>
-              </a:rPr>
-              <a:t>https://docs.scipy.org/doc/scipy/reference</a:t>
-            </a:r>
-            <a:r>
-              <a:rPr lang="en-GB" sz="1800" dirty="0" smtClean="0">
-                <a:hlinkClick r:id="rId4"/>
-              </a:rPr>
-              <a:t>/</a:t>
-            </a:r>
-            <a:r>
-              <a:rPr lang="en-GB" sz="1800" dirty="0" smtClean="0"/>
-              <a:t> </a:t>
-            </a:r>
-          </a:p>
-          <a:p>
-            <a:r>
-              <a:rPr lang="en-GB" sz="2400" dirty="0" smtClean="0"/>
-              <a:t>Google is your friend!</a:t>
-            </a:r>
-          </a:p>
-          <a:p>
-            <a:pPr lvl="1"/>
-            <a:r>
-              <a:rPr lang="en-GB" sz="1800" dirty="0" smtClean="0"/>
-              <a:t>Phrase questions carefully</a:t>
-            </a:r>
-          </a:p>
-          <a:p>
-            <a:pPr lvl="1"/>
-            <a:r>
-              <a:rPr lang="en-GB" sz="1800" dirty="0" smtClean="0"/>
-              <a:t>Stack Overflow</a:t>
-            </a:r>
-          </a:p>
-          <a:p>
-            <a:r>
-              <a:rPr lang="en-GB" sz="2400" dirty="0" smtClean="0"/>
-              <a:t>Many online tutorials, some better than others</a:t>
-            </a:r>
-          </a:p>
-          <a:p>
-            <a:r>
-              <a:rPr lang="en-GB" sz="2400" dirty="0" smtClean="0"/>
-              <a:t>Free </a:t>
-            </a:r>
-            <a:r>
-              <a:rPr lang="en-GB" sz="2400" dirty="0" err="1" smtClean="0"/>
-              <a:t>Ebooks</a:t>
-            </a:r>
-            <a:r>
-              <a:rPr lang="en-GB" sz="2400" dirty="0" smtClean="0"/>
-              <a:t> if you are that way inclined</a:t>
-            </a:r>
-          </a:p>
-          <a:p>
-            <a:pPr lvl="1"/>
-            <a:r>
-              <a:rPr lang="en-GB" sz="1800" dirty="0" smtClean="0"/>
-              <a:t>E.g. </a:t>
-            </a:r>
-            <a:r>
-              <a:rPr lang="en-GB" sz="1800" dirty="0" smtClean="0">
-                <a:hlinkClick r:id="rId5"/>
-              </a:rPr>
-              <a:t>https</a:t>
-            </a:r>
-            <a:r>
-              <a:rPr lang="en-GB" sz="1800" dirty="0">
-                <a:hlinkClick r:id="rId5"/>
-              </a:rPr>
-              <a:t>://</a:t>
-            </a:r>
-            <a:r>
-              <a:rPr lang="en-GB" sz="1800" dirty="0" smtClean="0">
-                <a:hlinkClick r:id="rId5"/>
-              </a:rPr>
-              <a:t>automatetheboringstuff.com/</a:t>
-            </a:r>
-            <a:r>
-              <a:rPr lang="en-GB" sz="1800" dirty="0" smtClean="0"/>
-              <a:t> </a:t>
-            </a:r>
-          </a:p>
-        </p:txBody>
-      </p:sp>
-    </p:spTree>
-    <p:extLst>
-      <p:ext uri="{BB962C8B-B14F-4D97-AF65-F5344CB8AC3E}">
-        <p14:creationId xmlns:p14="http://schemas.microsoft.com/office/powerpoint/2010/main" val="4169198258"/>
-      </p:ext>
-    </p:extLst>
-  </p:cSld>
-  <p:clrMapOvr>
-    <a:masterClrMapping/>
-  </p:clrMapOvr>
-  <p:timing>
-    <p:tnLst>
-      <p:par>
-        <p:cTn id="1" dur="indefinite" restart="never" nodeType="tmRoot"/>
-      </p:par>
-    </p:tnLst>
-  </p:timing>
-</p:sld>
-</file>
-
-<file path=ppt/slides/slide19.xml><?xml version="1.0" encoding="utf-8"?>
-<p:sld xmlns:a="http://schemas.openxmlformats.org/drawingml/2006/main" xmlns:r="http://schemas.openxmlformats.org/officeDocument/2006/relationships" xmlns:p="http://schemas.openxmlformats.org/presentationml/2006/main">
-  <p:cSld>
-    <p:spTree>
-      <p:nvGrpSpPr>
-        <p:cNvPr id="1" name=""/>
-        <p:cNvGrpSpPr/>
-        <p:nvPr/>
-      </p:nvGrpSpPr>
-      <p:grpSpPr>
-        <a:xfrm>
-          <a:off x="0" y="0"/>
-          <a:ext cx="0" cy="0"/>
-          <a:chOff x="0" y="0"/>
-          <a:chExt cx="0" cy="0"/>
-        </a:xfrm>
-      </p:grpSpPr>
-      <p:sp>
-        <p:nvSpPr>
-          <p:cNvPr id="2" name="Title 1"/>
-          <p:cNvSpPr>
-            <a:spLocks noGrp="1"/>
-          </p:cNvSpPr>
-          <p:nvPr>
-            <p:ph type="title"/>
-          </p:nvPr>
-        </p:nvSpPr>
-        <p:spPr/>
-        <p:txBody>
-          <a:bodyPr/>
-          <a:lstStyle/>
-          <a:p>
-            <a:r>
-              <a:rPr lang="en-GB" dirty="0" smtClean="0"/>
-              <a:t>Course Outline</a:t>
-            </a:r>
-            <a:endParaRPr lang="en-GB" dirty="0"/>
-          </a:p>
-        </p:txBody>
-      </p:sp>
-      <p:sp>
-        <p:nvSpPr>
-          <p:cNvPr id="4" name="Content Placeholder 2"/>
-          <p:cNvSpPr>
-            <a:spLocks noGrp="1"/>
-          </p:cNvSpPr>
-          <p:nvPr>
-            <p:ph idx="1"/>
-          </p:nvPr>
-        </p:nvSpPr>
-        <p:spPr>
-          <a:xfrm>
-            <a:off x="628650" y="1825625"/>
-            <a:ext cx="7886700" cy="4351338"/>
-          </a:xfrm>
-        </p:spPr>
-        <p:txBody>
-          <a:bodyPr/>
-          <a:lstStyle/>
-          <a:p>
-            <a:r>
-              <a:rPr lang="en-GB" dirty="0" smtClean="0"/>
-              <a:t>4 </a:t>
-            </a:r>
-            <a:r>
-              <a:rPr lang="en-GB" dirty="0" smtClean="0"/>
-              <a:t>interactive workshops – little formal tuition, learn by doing</a:t>
-            </a:r>
-          </a:p>
-          <a:p>
-            <a:pPr lvl="1"/>
-            <a:r>
-              <a:rPr lang="en-GB" dirty="0" smtClean="0"/>
-              <a:t>Help each other, some will have experience, some none at all</a:t>
-            </a:r>
-          </a:p>
-          <a:p>
-            <a:r>
-              <a:rPr lang="en-GB" dirty="0" smtClean="0"/>
-              <a:t>Everyone should complete the basic material</a:t>
-            </a:r>
-          </a:p>
-          <a:p>
-            <a:pPr lvl="1"/>
-            <a:r>
-              <a:rPr lang="en-GB" dirty="0" smtClean="0"/>
-              <a:t>There are extension problems for those interested</a:t>
-            </a:r>
-          </a:p>
-          <a:p>
-            <a:r>
-              <a:rPr lang="en-GB" dirty="0" smtClean="0"/>
-              <a:t>Later Course by Dr Paddy Royall covering more details of simulation techniques</a:t>
-            </a:r>
           </a:p>
         </p:txBody>
       </p:sp>
@@ -5002,14 +5389,13 @@
           <a:p>
             <a:r>
               <a:rPr lang="en-GB" dirty="0" smtClean="0"/>
-              <a:t>Where to go for help</a:t>
-            </a:r>
-          </a:p>
-          <a:p>
-            <a:r>
-              <a:rPr lang="en-GB" dirty="0" smtClean="0"/>
-              <a:t>Outline of this course</a:t>
-            </a:r>
+              <a:t>Where to go for </a:t>
+            </a:r>
+            <a:r>
+              <a:rPr lang="en-GB" dirty="0" smtClean="0"/>
+              <a:t>help</a:t>
+            </a:r>
+            <a:endParaRPr lang="en-GB" dirty="0" smtClean="0"/>
           </a:p>
         </p:txBody>
       </p:sp>
@@ -5443,7 +5829,7 @@
         </p:spPr>
         <p:txBody>
           <a:bodyPr>
-            <a:normAutofit fontScale="62500" lnSpcReduction="20000"/>
+            <a:noAutofit/>
           </a:bodyPr>
           <a:lstStyle/>
           <a:p>
@@ -5451,25 +5837,25 @@
               <a:buNone/>
             </a:pPr>
             <a:r>
-              <a:rPr lang="en-GB" sz="5100" u="sng" dirty="0" smtClean="0"/>
+              <a:rPr lang="en-GB" u="sng" dirty="0" smtClean="0"/>
               <a:t>C:</a:t>
             </a:r>
-            <a:endParaRPr lang="en-GB" sz="4400" u="sng" dirty="0"/>
+            <a:endParaRPr lang="en-GB" u="sng" dirty="0"/>
           </a:p>
           <a:p>
             <a:pPr marL="0" indent="0">
               <a:buNone/>
             </a:pPr>
             <a:r>
-              <a:rPr lang="en-GB" dirty="0" err="1" smtClean="0"/>
+              <a:rPr lang="en-GB" sz="1800" dirty="0" err="1" smtClean="0"/>
               <a:t>int</a:t>
             </a:r>
             <a:r>
-              <a:rPr lang="en-GB" dirty="0" smtClean="0"/>
+              <a:rPr lang="en-GB" sz="1800" dirty="0" smtClean="0"/>
               <a:t> </a:t>
             </a:r>
             <a:r>
-              <a:rPr lang="en-GB" dirty="0"/>
+              <a:rPr lang="en-GB" sz="1800" dirty="0"/>
               <a:t>main() {  </a:t>
             </a:r>
           </a:p>
@@ -5478,47 +5864,51 @@
               <a:buNone/>
             </a:pPr>
             <a:r>
-              <a:rPr lang="en-GB" dirty="0"/>
+              <a:rPr lang="en-GB" sz="1800" dirty="0"/>
               <a:t>  </a:t>
             </a:r>
             <a:r>
-              <a:rPr lang="en-GB" dirty="0" err="1"/>
+              <a:rPr lang="en-GB" sz="1800" dirty="0" smtClean="0"/>
+              <a:t>  </a:t>
+            </a:r>
+            <a:r>
+              <a:rPr lang="en-GB" sz="1800" dirty="0" err="1" smtClean="0"/>
               <a:t>int</a:t>
             </a:r>
             <a:r>
-              <a:rPr lang="en-GB" dirty="0"/>
+              <a:rPr lang="en-GB" sz="1800" dirty="0" smtClean="0"/>
               <a:t> </a:t>
             </a:r>
             <a:r>
-              <a:rPr lang="en-GB" dirty="0" err="1"/>
+              <a:rPr lang="en-GB" sz="1800" dirty="0" err="1"/>
               <a:t>my_array</a:t>
             </a:r>
             <a:r>
-              <a:rPr lang="en-GB" dirty="0"/>
+              <a:rPr lang="en-GB" sz="1800" dirty="0"/>
               <a:t>[3][3] </a:t>
             </a:r>
             <a:r>
-              <a:rPr lang="en-GB" dirty="0" smtClean="0"/>
+              <a:rPr lang="en-GB" sz="1800" dirty="0" smtClean="0"/>
               <a:t>=  </a:t>
             </a:r>
             <a:r>
-              <a:rPr lang="en-GB" dirty="0"/>
+              <a:rPr lang="en-GB" sz="1800" dirty="0"/>
               <a:t>10, 23, 42, </a:t>
             </a:r>
             <a:r>
-              <a:rPr lang="en-GB" dirty="0" smtClean="0"/>
+              <a:rPr lang="en-GB" sz="1800" dirty="0" smtClean="0"/>
               <a:t>1</a:t>
             </a:r>
             <a:r>
-              <a:rPr lang="en-GB" dirty="0"/>
+              <a:rPr lang="en-GB" sz="1800" dirty="0"/>
               <a:t>, 654, 0, </a:t>
             </a:r>
             <a:r>
-              <a:rPr lang="en-GB" dirty="0" smtClean="0"/>
+              <a:rPr lang="en-GB" sz="1800" dirty="0" smtClean="0"/>
               <a:t>40652</a:t>
             </a:r>
             <a:r>
-              <a:rPr lang="en-GB" dirty="0"/>
+              <a:rPr lang="en-GB" sz="1800" dirty="0"/>
               <a:t>, 22, 0  </a:t>
             </a:r>
           </a:p>
@@ -5526,23 +5916,79 @@
             <a:pPr marL="0" indent="0">
               <a:buNone/>
             </a:pPr>
-            <a:endParaRPr lang="en-GB" dirty="0"/>
+            <a:endParaRPr lang="en-GB" sz="1800" dirty="0" smtClean="0"/>
           </a:p>
           <a:p>
             <a:pPr marL="0" indent="0">
               <a:buNone/>
             </a:pPr>
             <a:r>
-              <a:rPr lang="en-GB" dirty="0"/>
-              <a:t>    </a:t>
-            </a:r>
-            <a:r>
-              <a:rPr lang="en-GB" dirty="0" err="1"/>
+              <a:rPr lang="en-GB" sz="1800" dirty="0" smtClean="0"/>
+              <a:t>    for(</a:t>
+            </a:r>
+            <a:r>
+              <a:rPr lang="en-GB" sz="1800" dirty="0" err="1" smtClean="0"/>
               <a:t>int</a:t>
             </a:r>
             <a:r>
-              <a:rPr lang="en-GB" dirty="0"/>
-              <a:t> index;</a:t>
+              <a:rPr lang="en-GB" sz="1800" dirty="0" smtClean="0"/>
+              <a:t> </a:t>
+            </a:r>
+            <a:r>
+              <a:rPr lang="en-GB" sz="1800" dirty="0" err="1" smtClean="0"/>
+              <a:t>i</a:t>
+            </a:r>
+            <a:r>
+              <a:rPr lang="en-GB" sz="1800" dirty="0" smtClean="0"/>
+              <a:t>= 0; </a:t>
+            </a:r>
+            <a:r>
+              <a:rPr lang="en-GB" sz="1800" dirty="0" err="1" smtClean="0"/>
+              <a:t>i</a:t>
+            </a:r>
+            <a:r>
+              <a:rPr lang="en-GB" sz="1800" dirty="0" smtClean="0"/>
+              <a:t>&lt; (</a:t>
+            </a:r>
+            <a:r>
+              <a:rPr lang="en-GB" sz="1800" dirty="0" err="1" smtClean="0"/>
+              <a:t>sizeof</a:t>
+            </a:r>
+            <a:r>
+              <a:rPr lang="en-GB" sz="1800" dirty="0" smtClean="0"/>
+              <a:t>( </a:t>
+            </a:r>
+            <a:r>
+              <a:rPr lang="en-GB" sz="1800" dirty="0" err="1" smtClean="0"/>
+              <a:t>my_array</a:t>
+            </a:r>
+            <a:r>
+              <a:rPr lang="en-GB" sz="1800" dirty="0" smtClean="0"/>
+              <a:t> ) / </a:t>
+            </a:r>
+            <a:r>
+              <a:rPr lang="en-GB" sz="1800" dirty="0" err="1" smtClean="0"/>
+              <a:t>sizeof</a:t>
+            </a:r>
+            <a:r>
+              <a:rPr lang="en-GB" sz="1800" dirty="0" smtClean="0"/>
+              <a:t>( </a:t>
+            </a:r>
+            <a:r>
+              <a:rPr lang="en-GB" sz="1800" dirty="0" err="1" smtClean="0"/>
+              <a:t>my_array</a:t>
+            </a:r>
+            <a:r>
+              <a:rPr lang="en-GB" sz="1800" dirty="0" smtClean="0"/>
+              <a:t>[0] )); </a:t>
+            </a:r>
+            <a:r>
+              <a:rPr lang="en-GB" sz="1800" dirty="0" err="1" smtClean="0"/>
+              <a:t>i</a:t>
+            </a:r>
+            <a:r>
+              <a:rPr lang="en-GB" sz="1800" dirty="0" smtClean="0"/>
+              <a:t>++){</a:t>
             </a:r>
           </a:p>
           <a:p>
@@ -5550,65 +5996,106 @@
               <a:buNone/>
             </a:pPr>
             <a:r>
-              <a:rPr lang="en-GB" dirty="0"/>
-              <a:t>    </a:t>
-            </a:r>
-            <a:r>
-              <a:rPr lang="en-GB" dirty="0" err="1"/>
+              <a:rPr lang="en-GB" sz="1800" dirty="0" smtClean="0"/>
+              <a:t>        for(</a:t>
+            </a:r>
+            <a:r>
+              <a:rPr lang="en-GB" sz="1800" dirty="0" err="1" smtClean="0"/>
               <a:t>int</a:t>
             </a:r>
             <a:r>
-              <a:rPr lang="en-GB" dirty="0"/>
-              <a:t> </a:t>
-            </a:r>
-            <a:r>
-              <a:rPr lang="en-GB" dirty="0" err="1"/>
-              <a:t>jdex</a:t>
-            </a:r>
-            <a:r>
-              <a:rPr lang="en-GB" dirty="0"/>
-              <a:t>;</a:t>
-            </a:r>
+              <a:rPr lang="en-GB" sz="1800" dirty="0" smtClean="0"/>
+              <a:t> j= </a:t>
+            </a:r>
+            <a:r>
+              <a:rPr lang="en-GB" sz="1800" dirty="0"/>
+              <a:t>0; </a:t>
+            </a:r>
+            <a:r>
+              <a:rPr lang="en-GB" sz="1800" dirty="0" smtClean="0"/>
+              <a:t>j&lt; </a:t>
+            </a:r>
+            <a:r>
+              <a:rPr lang="en-GB" sz="1800" dirty="0"/>
+              <a:t>(</a:t>
+            </a:r>
+            <a:r>
+              <a:rPr lang="en-GB" sz="1800" dirty="0" err="1"/>
+              <a:t>sizeof</a:t>
+            </a:r>
+            <a:r>
+              <a:rPr lang="en-GB" sz="1800" dirty="0"/>
+              <a:t>( </a:t>
+            </a:r>
+            <a:r>
+              <a:rPr lang="en-GB" sz="1800" dirty="0" err="1"/>
+              <a:t>my_array</a:t>
+            </a:r>
+            <a:r>
+              <a:rPr lang="en-GB" sz="1800" dirty="0"/>
+              <a:t> ) / </a:t>
+            </a:r>
+            <a:r>
+              <a:rPr lang="en-GB" sz="1800" dirty="0" err="1"/>
+              <a:t>sizeof</a:t>
+            </a:r>
+            <a:r>
+              <a:rPr lang="en-GB" sz="1800" dirty="0"/>
+              <a:t>( </a:t>
+            </a:r>
+            <a:r>
+              <a:rPr lang="en-GB" sz="1800" dirty="0" err="1"/>
+              <a:t>my_array</a:t>
+            </a:r>
+            <a:r>
+              <a:rPr lang="en-GB" sz="1800" dirty="0"/>
+              <a:t>[0] )); </a:t>
+            </a:r>
+            <a:r>
+              <a:rPr lang="en-GB" sz="1800" dirty="0" err="1" smtClean="0"/>
+              <a:t>j++</a:t>
+            </a:r>
+            <a:r>
+              <a:rPr lang="en-GB" sz="1800" dirty="0" smtClean="0"/>
+              <a:t>){</a:t>
+            </a:r>
+            <a:endParaRPr lang="en-GB" sz="1800" dirty="0"/>
           </a:p>
           <a:p>
             <a:pPr marL="0" indent="0">
               <a:buNone/>
             </a:pPr>
             <a:r>
-              <a:rPr lang="en-GB" dirty="0"/>
-              <a:t>    for( index = 0; index &lt; (</a:t>
-            </a:r>
-            <a:r>
-              <a:rPr lang="en-GB" dirty="0" err="1"/>
-              <a:t>sizeof</a:t>
-            </a:r>
-            <a:r>
-              <a:rPr lang="en-GB" dirty="0"/>
-              <a:t>( </a:t>
-            </a:r>
-            <a:r>
-              <a:rPr lang="en-GB" dirty="0" err="1"/>
+              <a:rPr lang="en-GB" sz="1800" dirty="0"/>
+              <a:t>            </a:t>
+            </a:r>
+            <a:r>
+              <a:rPr lang="en-GB" sz="1800" dirty="0" err="1"/>
+              <a:t>printf</a:t>
+            </a:r>
+            <a:r>
+              <a:rPr lang="en-GB" sz="1800" dirty="0"/>
+              <a:t>( "%d", </a:t>
+            </a:r>
+            <a:r>
+              <a:rPr lang="en-GB" sz="1800" dirty="0" err="1" smtClean="0"/>
               <a:t>my_array</a:t>
             </a:r>
             <a:r>
-              <a:rPr lang="en-GB" dirty="0"/>
-              <a:t> ) / </a:t>
-            </a:r>
-            <a:r>
-              <a:rPr lang="en-GB" dirty="0" err="1"/>
-              <a:t>sizeof</a:t>
-            </a:r>
-            <a:r>
-              <a:rPr lang="en-GB" dirty="0"/>
-              <a:t>( </a:t>
-            </a:r>
-            <a:r>
-              <a:rPr lang="en-GB" dirty="0" err="1"/>
-              <a:t>my_array</a:t>
-            </a:r>
-            <a:r>
-              <a:rPr lang="en-GB" dirty="0"/>
-              <a:t>[0] )); index++){</a:t>
+              <a:rPr lang="en-GB" sz="1800" dirty="0" smtClean="0"/>
+              <a:t>[</a:t>
+            </a:r>
+            <a:r>
+              <a:rPr lang="en-GB" sz="1800" dirty="0" err="1" smtClean="0"/>
+              <a:t>i</a:t>
+            </a:r>
+            <a:r>
+              <a:rPr lang="en-GB" sz="1800" dirty="0" smtClean="0"/>
+              <a:t>][j] </a:t>
+            </a:r>
+            <a:r>
+              <a:rPr lang="en-GB" sz="1800" dirty="0"/>
+              <a:t>);</a:t>
             </a:r>
           </a:p>
           <a:p>
@@ -5616,64 +6103,16 @@
               <a:buNone/>
             </a:pPr>
             <a:r>
-              <a:rPr lang="en-GB" dirty="0"/>
-              <a:t>        for( </a:t>
-            </a:r>
-            <a:r>
-              <a:rPr lang="en-GB" dirty="0" err="1"/>
-              <a:t>jdex</a:t>
-            </a:r>
-            <a:r>
-              <a:rPr lang="en-GB" dirty="0"/>
-              <a:t> = 0; </a:t>
-            </a:r>
-            <a:r>
-              <a:rPr lang="en-GB" dirty="0" err="1"/>
-              <a:t>jdex</a:t>
-            </a:r>
-            <a:r>
-              <a:rPr lang="en-GB" dirty="0"/>
-              <a:t> &lt; (</a:t>
-            </a:r>
-            <a:r>
-              <a:rPr lang="en-GB" dirty="0" err="1"/>
-              <a:t>sizeof</a:t>
-            </a:r>
-            <a:r>
-              <a:rPr lang="en-GB" dirty="0"/>
-              <a:t>( </a:t>
-            </a:r>
-            <a:r>
-              <a:rPr lang="en-GB" dirty="0" err="1"/>
-              <a:t>my_array</a:t>
-            </a:r>
-            <a:r>
-              <a:rPr lang="en-GB" dirty="0"/>
-              <a:t> ) / </a:t>
-            </a:r>
-            <a:r>
-              <a:rPr lang="en-GB" dirty="0" err="1"/>
-              <a:t>sizeof</a:t>
-            </a:r>
-            <a:r>
-              <a:rPr lang="en-GB" dirty="0"/>
-              <a:t>( </a:t>
-            </a:r>
-            <a:r>
-              <a:rPr lang="en-GB" dirty="0" err="1"/>
-              <a:t>my_array</a:t>
-            </a:r>
-            <a:r>
-              <a:rPr lang="en-GB" dirty="0"/>
-              <a:t>[0] )); </a:t>
-            </a:r>
-            <a:r>
-              <a:rPr lang="en-GB" dirty="0" err="1"/>
-              <a:t>jdex</a:t>
-            </a:r>
-            <a:r>
-              <a:rPr lang="en-GB" dirty="0"/>
-              <a:t>++){</a:t>
+              <a:rPr lang="en-GB" sz="1800" dirty="0"/>
+              <a:t>            </a:t>
+            </a:r>
+            <a:r>
+              <a:rPr lang="en-GB" sz="1800" dirty="0" err="1"/>
+              <a:t>printf</a:t>
+            </a:r>
+            <a:r>
+              <a:rPr lang="en-GB" sz="1800" dirty="0"/>
+              <a:t>( "\n" );</a:t>
             </a:r>
           </a:p>
           <a:p>
@@ -5681,32 +6120,8 @@
               <a:buNone/>
             </a:pPr>
             <a:r>
-              <a:rPr lang="en-GB" dirty="0"/>
-              <a:t>            </a:t>
-            </a:r>
-            <a:r>
-              <a:rPr lang="en-GB" dirty="0" err="1"/>
-              <a:t>printf</a:t>
-            </a:r>
-            <a:r>
-              <a:rPr lang="en-GB" dirty="0"/>
-              <a:t>( "%d", </a:t>
-            </a:r>
-            <a:r>
-              <a:rPr lang="en-GB" dirty="0" err="1"/>
-              <a:t>my_array</a:t>
-            </a:r>
-            <a:r>
-              <a:rPr lang="en-GB" dirty="0"/>
-              <a:t>[index][</a:t>
-            </a:r>
-            <a:r>
-              <a:rPr lang="en-GB" dirty="0" err="1"/>
-              <a:t>jdex</a:t>
-            </a:r>
-            <a:r>
-              <a:rPr lang="en-GB" dirty="0"/>
-              <a:t>] );</a:t>
+              <a:rPr lang="en-GB" sz="1800" dirty="0"/>
+              <a:t>        }</a:t>
             </a:r>
           </a:p>
           <a:p>
@@ -5714,16 +6129,8 @@
               <a:buNone/>
             </a:pPr>
             <a:r>
-              <a:rPr lang="en-GB" dirty="0"/>
-              <a:t>            </a:t>
-            </a:r>
-            <a:r>
-              <a:rPr lang="en-GB" dirty="0" err="1"/>
-              <a:t>printf</a:t>
-            </a:r>
-            <a:r>
-              <a:rPr lang="en-GB" dirty="0"/>
-              <a:t>( "\n" );</a:t>
+              <a:rPr lang="en-GB" sz="1800" dirty="0"/>
+              <a:t>    }</a:t>
             </a:r>
           </a:p>
           <a:p>
@@ -5731,25 +6138,7 @@
               <a:buNone/>
             </a:pPr>
             <a:r>
-              <a:rPr lang="en-GB" dirty="0"/>
-              <a:t>        }</a:t>
-            </a:r>
-          </a:p>
-          <a:p>
-            <a:pPr marL="0" indent="0">
-              <a:buNone/>
-            </a:pPr>
-            <a:r>
-              <a:rPr lang="en-GB" dirty="0"/>
-              <a:t>    }</a:t>
-            </a:r>
-          </a:p>
-          <a:p>
-            <a:pPr marL="0" indent="0">
-              <a:buNone/>
-            </a:pPr>
-            <a:r>
-              <a:rPr lang="en-GB" dirty="0"/>
+              <a:rPr lang="en-GB" sz="1800" dirty="0"/>
               <a:t>}</a:t>
             </a:r>
           </a:p>
@@ -5889,8 +6278,16 @@
               <a:t>    print </a:t>
             </a:r>
             <a:r>
-              <a:rPr lang="en-GB" sz="1800" dirty="0" err="1"/>
+              <a:rPr lang="en-GB" sz="1800" dirty="0" smtClean="0"/>
+              <a:t>(</a:t>
+            </a:r>
+            <a:r>
+              <a:rPr lang="en-GB" sz="1800" dirty="0" err="1" smtClean="0"/>
               <a:t>my_list</a:t>
+            </a:r>
+            <a:r>
+              <a:rPr lang="en-GB" sz="1800" dirty="0" smtClean="0"/>
+              <a:t>)</a:t>
             </a:r>
             <a:endParaRPr lang="en-GB" sz="1800" dirty="0"/>
           </a:p>
@@ -6136,7 +6533,11 @@
             <a:pPr lvl="1"/>
             <a:r>
               <a:rPr lang="en-GB" dirty="0" smtClean="0"/>
-              <a:t>The “big 3” are waning – more open market. Skills are important not a specific language</a:t>
+              <a:t>Programming now a more </a:t>
+            </a:r>
+            <a:r>
+              <a:rPr lang="en-GB" dirty="0" smtClean="0"/>
+              <a:t>open market. Skills are important not a specific language</a:t>
             </a:r>
           </a:p>
           <a:p>

</xml_diff>